<commit_message>
Update with new figures
</commit_message>
<xml_diff>
--- a/Document/figures/biology_plots/Age1_1plots.pptx
+++ b/Document/figures/biology_plots/Age1_1plots.pptx
@@ -243,7 +243,7 @@
           <a:p>
             <a:fld id="{2F7AB695-DBB0-4C29-B4DA-C3C73C56F55B}" type="datetimeFigureOut">
               <a:rPr lang="en-US" smtClean="0"/>
-              <a:t>6/9/2023</a:t>
+              <a:t>6/23/2023</a:t>
             </a:fld>
             <a:endParaRPr lang="en-US"/>
           </a:p>
@@ -413,7 +413,7 @@
           <a:p>
             <a:fld id="{2F7AB695-DBB0-4C29-B4DA-C3C73C56F55B}" type="datetimeFigureOut">
               <a:rPr lang="en-US" smtClean="0"/>
-              <a:t>6/9/2023</a:t>
+              <a:t>6/23/2023</a:t>
             </a:fld>
             <a:endParaRPr lang="en-US"/>
           </a:p>
@@ -593,7 +593,7 @@
           <a:p>
             <a:fld id="{2F7AB695-DBB0-4C29-B4DA-C3C73C56F55B}" type="datetimeFigureOut">
               <a:rPr lang="en-US" smtClean="0"/>
-              <a:t>6/9/2023</a:t>
+              <a:t>6/23/2023</a:t>
             </a:fld>
             <a:endParaRPr lang="en-US"/>
           </a:p>
@@ -763,7 +763,7 @@
           <a:p>
             <a:fld id="{2F7AB695-DBB0-4C29-B4DA-C3C73C56F55B}" type="datetimeFigureOut">
               <a:rPr lang="en-US" smtClean="0"/>
-              <a:t>6/9/2023</a:t>
+              <a:t>6/23/2023</a:t>
             </a:fld>
             <a:endParaRPr lang="en-US"/>
           </a:p>
@@ -1009,7 +1009,7 @@
           <a:p>
             <a:fld id="{2F7AB695-DBB0-4C29-B4DA-C3C73C56F55B}" type="datetimeFigureOut">
               <a:rPr lang="en-US" smtClean="0"/>
-              <a:t>6/9/2023</a:t>
+              <a:t>6/23/2023</a:t>
             </a:fld>
             <a:endParaRPr lang="en-US"/>
           </a:p>
@@ -1241,7 +1241,7 @@
           <a:p>
             <a:fld id="{2F7AB695-DBB0-4C29-B4DA-C3C73C56F55B}" type="datetimeFigureOut">
               <a:rPr lang="en-US" smtClean="0"/>
-              <a:t>6/9/2023</a:t>
+              <a:t>6/23/2023</a:t>
             </a:fld>
             <a:endParaRPr lang="en-US"/>
           </a:p>
@@ -1608,7 +1608,7 @@
           <a:p>
             <a:fld id="{2F7AB695-DBB0-4C29-B4DA-C3C73C56F55B}" type="datetimeFigureOut">
               <a:rPr lang="en-US" smtClean="0"/>
-              <a:t>6/9/2023</a:t>
+              <a:t>6/23/2023</a:t>
             </a:fld>
             <a:endParaRPr lang="en-US"/>
           </a:p>
@@ -1726,7 +1726,7 @@
           <a:p>
             <a:fld id="{2F7AB695-DBB0-4C29-B4DA-C3C73C56F55B}" type="datetimeFigureOut">
               <a:rPr lang="en-US" smtClean="0"/>
-              <a:t>6/9/2023</a:t>
+              <a:t>6/23/2023</a:t>
             </a:fld>
             <a:endParaRPr lang="en-US"/>
           </a:p>
@@ -1821,7 +1821,7 @@
           <a:p>
             <a:fld id="{2F7AB695-DBB0-4C29-B4DA-C3C73C56F55B}" type="datetimeFigureOut">
               <a:rPr lang="en-US" smtClean="0"/>
-              <a:t>6/9/2023</a:t>
+              <a:t>6/23/2023</a:t>
             </a:fld>
             <a:endParaRPr lang="en-US"/>
           </a:p>
@@ -2098,7 +2098,7 @@
           <a:p>
             <a:fld id="{2F7AB695-DBB0-4C29-B4DA-C3C73C56F55B}" type="datetimeFigureOut">
               <a:rPr lang="en-US" smtClean="0"/>
-              <a:t>6/9/2023</a:t>
+              <a:t>6/23/2023</a:t>
             </a:fld>
             <a:endParaRPr lang="en-US"/>
           </a:p>
@@ -2351,7 +2351,7 @@
           <a:p>
             <a:fld id="{2F7AB695-DBB0-4C29-B4DA-C3C73C56F55B}" type="datetimeFigureOut">
               <a:rPr lang="en-US" smtClean="0"/>
-              <a:t>6/9/2023</a:t>
+              <a:t>6/23/2023</a:t>
             </a:fld>
             <a:endParaRPr lang="en-US"/>
           </a:p>
@@ -2564,7 +2564,7 @@
           <a:p>
             <a:fld id="{2F7AB695-DBB0-4C29-B4DA-C3C73C56F55B}" type="datetimeFigureOut">
               <a:rPr lang="en-US" smtClean="0"/>
-              <a:t>6/9/2023</a:t>
+              <a:t>6/23/2023</a:t>
             </a:fld>
             <a:endParaRPr lang="en-US"/>
           </a:p>
@@ -2969,96 +2969,111 @@
           <a:chExt cx="0" cy="0"/>
         </a:xfrm>
       </p:grpSpPr>
-      <p:pic>
-        <p:nvPicPr>
-          <p:cNvPr id="10" name="Picture 9"/>
-          <p:cNvPicPr>
-            <a:picLocks noChangeAspect="1"/>
-          </p:cNvPicPr>
+      <p:grpSp>
+        <p:nvGrpSpPr>
+          <p:cNvPr id="5" name="Group 4"/>
+          <p:cNvGrpSpPr/>
           <p:nvPr/>
-        </p:nvPicPr>
-        <p:blipFill>
-          <a:blip r:embed="rId2">
-            <a:extLst>
-              <a:ext uri="{28A0092B-C50C-407E-A947-70E740481C1C}">
-                <a14:useLocalDpi xmlns:a14="http://schemas.microsoft.com/office/drawing/2010/main" val="0"/>
-              </a:ext>
-            </a:extLst>
-          </a:blip>
-          <a:stretch>
-            <a:fillRect/>
-          </a:stretch>
-        </p:blipFill>
-        <p:spPr>
+        </p:nvGrpSpPr>
+        <p:grpSpPr>
           <a:xfrm>
-            <a:off x="0" y="2083243"/>
-            <a:ext cx="4037478" cy="2651760"/>
+            <a:off x="2051440" y="811038"/>
+            <a:ext cx="8074955" cy="5418815"/>
+            <a:chOff x="2051440" y="811038"/>
+            <a:chExt cx="8074955" cy="5418815"/>
           </a:xfrm>
-          <a:prstGeom prst="rect">
-            <a:avLst/>
-          </a:prstGeom>
-        </p:spPr>
-      </p:pic>
-      <p:pic>
-        <p:nvPicPr>
-          <p:cNvPr id="11" name="Picture 10"/>
-          <p:cNvPicPr>
-            <a:picLocks noChangeAspect="1"/>
-          </p:cNvPicPr>
-          <p:nvPr/>
-        </p:nvPicPr>
-        <p:blipFill>
-          <a:blip r:embed="rId3">
-            <a:extLst>
-              <a:ext uri="{28A0092B-C50C-407E-A947-70E740481C1C}">
-                <a14:useLocalDpi xmlns:a14="http://schemas.microsoft.com/office/drawing/2010/main" val="0"/>
-              </a:ext>
-            </a:extLst>
-          </a:blip>
-          <a:stretch>
-            <a:fillRect/>
-          </a:stretch>
-        </p:blipFill>
-        <p:spPr>
-          <a:xfrm>
-            <a:off x="8152349" y="2083243"/>
-            <a:ext cx="4037478" cy="2651760"/>
-          </a:xfrm>
-          <a:prstGeom prst="rect">
-            <a:avLst/>
-          </a:prstGeom>
-        </p:spPr>
-      </p:pic>
-      <p:pic>
-        <p:nvPicPr>
-          <p:cNvPr id="2" name="Picture 1"/>
-          <p:cNvPicPr>
-            <a:picLocks noChangeAspect="1"/>
-          </p:cNvPicPr>
-          <p:nvPr/>
-        </p:nvPicPr>
-        <p:blipFill>
-          <a:blip r:embed="rId4">
-            <a:extLst>
-              <a:ext uri="{28A0092B-C50C-407E-A947-70E740481C1C}">
-                <a14:useLocalDpi xmlns:a14="http://schemas.microsoft.com/office/drawing/2010/main" val="0"/>
-              </a:ext>
-            </a:extLst>
-          </a:blip>
-          <a:stretch>
-            <a:fillRect/>
-          </a:stretch>
-        </p:blipFill>
-        <p:spPr>
-          <a:xfrm>
-            <a:off x="4037478" y="2083243"/>
-            <a:ext cx="4037477" cy="2651760"/>
-          </a:xfrm>
-          <a:prstGeom prst="rect">
-            <a:avLst/>
-          </a:prstGeom>
-        </p:spPr>
-      </p:pic>
+        </p:grpSpPr>
+        <p:pic>
+          <p:nvPicPr>
+            <p:cNvPr id="10" name="Picture 9"/>
+            <p:cNvPicPr>
+              <a:picLocks noChangeAspect="1"/>
+            </p:cNvPicPr>
+            <p:nvPr/>
+          </p:nvPicPr>
+          <p:blipFill>
+            <a:blip r:embed="rId2">
+              <a:extLst>
+                <a:ext uri="{28A0092B-C50C-407E-A947-70E740481C1C}">
+                  <a14:useLocalDpi xmlns:a14="http://schemas.microsoft.com/office/drawing/2010/main" val="0"/>
+                </a:ext>
+              </a:extLst>
+            </a:blip>
+            <a:stretch>
+              <a:fillRect/>
+            </a:stretch>
+          </p:blipFill>
+          <p:spPr>
+            <a:xfrm>
+              <a:off x="2051440" y="811038"/>
+              <a:ext cx="4037478" cy="2651760"/>
+            </a:xfrm>
+            <a:prstGeom prst="rect">
+              <a:avLst/>
+            </a:prstGeom>
+          </p:spPr>
+        </p:pic>
+        <p:pic>
+          <p:nvPicPr>
+            <p:cNvPr id="11" name="Picture 10"/>
+            <p:cNvPicPr>
+              <a:picLocks noChangeAspect="1"/>
+            </p:cNvPicPr>
+            <p:nvPr/>
+          </p:nvPicPr>
+          <p:blipFill>
+            <a:blip r:embed="rId3">
+              <a:extLst>
+                <a:ext uri="{28A0092B-C50C-407E-A947-70E740481C1C}">
+                  <a14:useLocalDpi xmlns:a14="http://schemas.microsoft.com/office/drawing/2010/main" val="0"/>
+                </a:ext>
+              </a:extLst>
+            </a:blip>
+            <a:stretch>
+              <a:fillRect/>
+            </a:stretch>
+          </p:blipFill>
+          <p:spPr>
+            <a:xfrm>
+              <a:off x="4078124" y="3578093"/>
+              <a:ext cx="4037478" cy="2651760"/>
+            </a:xfrm>
+            <a:prstGeom prst="rect">
+              <a:avLst/>
+            </a:prstGeom>
+          </p:spPr>
+        </p:pic>
+        <p:pic>
+          <p:nvPicPr>
+            <p:cNvPr id="2" name="Picture 1"/>
+            <p:cNvPicPr>
+              <a:picLocks noChangeAspect="1"/>
+            </p:cNvPicPr>
+            <p:nvPr/>
+          </p:nvPicPr>
+          <p:blipFill>
+            <a:blip r:embed="rId4">
+              <a:extLst>
+                <a:ext uri="{28A0092B-C50C-407E-A947-70E740481C1C}">
+                  <a14:useLocalDpi xmlns:a14="http://schemas.microsoft.com/office/drawing/2010/main" val="0"/>
+                </a:ext>
+              </a:extLst>
+            </a:blip>
+            <a:stretch>
+              <a:fillRect/>
+            </a:stretch>
+          </p:blipFill>
+          <p:spPr>
+            <a:xfrm>
+              <a:off x="6088918" y="811038"/>
+              <a:ext cx="4037477" cy="2651760"/>
+            </a:xfrm>
+            <a:prstGeom prst="rect">
+              <a:avLst/>
+            </a:prstGeom>
+          </p:spPr>
+        </p:pic>
+      </p:grpSp>
     </p:spTree>
     <p:extLst>
       <p:ext uri="{BB962C8B-B14F-4D97-AF65-F5344CB8AC3E}">

</xml_diff>